<commit_message>
Cleanup and starting to work on the Asus Card doc
</commit_message>
<xml_diff>
--- a/pptx/thunderbolt-display-setup-diagram.pptx
+++ b/pptx/thunderbolt-display-setup-diagram.pptx
@@ -6,6 +6,7 @@
   </p:sldMasterIdLst>
   <p:sldIdLst>
     <p:sldId id="256" r:id="rId2"/>
+    <p:sldId id="257" r:id="rId3"/>
   </p:sldIdLst>
   <p:sldSz cx="12192000" cy="6858000"/>
   <p:notesSz cx="6858000" cy="9144000"/>
@@ -104,6 +105,11 @@
       </a:defRPr>
     </a:lvl9pPr>
   </p:defaultTextStyle>
+  <p:extLst>
+    <p:ext uri="{EFAFB233-063F-42B5-8137-9DF3F51BA10A}">
+      <p15:sldGuideLst xmlns:p15="http://schemas.microsoft.com/office/powerpoint/2012/main"/>
+    </p:ext>
+  </p:extLst>
 </p:presentation>
 </file>
 
@@ -254,7 +260,7 @@
           <a:p>
             <a:fld id="{071CE23B-2943-3043-A28D-A3C0690BC927}" type="datetimeFigureOut">
               <a:rPr lang="en-US" smtClean="0"/>
-              <a:t>3/15/20</a:t>
+              <a:t>3/17/20</a:t>
             </a:fld>
             <a:endParaRPr lang="en-US"/>
           </a:p>
@@ -452,7 +458,7 @@
           <a:p>
             <a:fld id="{071CE23B-2943-3043-A28D-A3C0690BC927}" type="datetimeFigureOut">
               <a:rPr lang="en-US" smtClean="0"/>
-              <a:t>3/15/20</a:t>
+              <a:t>3/17/20</a:t>
             </a:fld>
             <a:endParaRPr lang="en-US"/>
           </a:p>
@@ -660,7 +666,7 @@
           <a:p>
             <a:fld id="{071CE23B-2943-3043-A28D-A3C0690BC927}" type="datetimeFigureOut">
               <a:rPr lang="en-US" smtClean="0"/>
-              <a:t>3/15/20</a:t>
+              <a:t>3/17/20</a:t>
             </a:fld>
             <a:endParaRPr lang="en-US"/>
           </a:p>
@@ -858,7 +864,7 @@
           <a:p>
             <a:fld id="{071CE23B-2943-3043-A28D-A3C0690BC927}" type="datetimeFigureOut">
               <a:rPr lang="en-US" smtClean="0"/>
-              <a:t>3/15/20</a:t>
+              <a:t>3/17/20</a:t>
             </a:fld>
             <a:endParaRPr lang="en-US"/>
           </a:p>
@@ -1133,7 +1139,7 @@
           <a:p>
             <a:fld id="{071CE23B-2943-3043-A28D-A3C0690BC927}" type="datetimeFigureOut">
               <a:rPr lang="en-US" smtClean="0"/>
-              <a:t>3/15/20</a:t>
+              <a:t>3/17/20</a:t>
             </a:fld>
             <a:endParaRPr lang="en-US"/>
           </a:p>
@@ -1398,7 +1404,7 @@
           <a:p>
             <a:fld id="{071CE23B-2943-3043-A28D-A3C0690BC927}" type="datetimeFigureOut">
               <a:rPr lang="en-US" smtClean="0"/>
-              <a:t>3/15/20</a:t>
+              <a:t>3/17/20</a:t>
             </a:fld>
             <a:endParaRPr lang="en-US"/>
           </a:p>
@@ -1810,7 +1816,7 @@
           <a:p>
             <a:fld id="{071CE23B-2943-3043-A28D-A3C0690BC927}" type="datetimeFigureOut">
               <a:rPr lang="en-US" smtClean="0"/>
-              <a:t>3/15/20</a:t>
+              <a:t>3/17/20</a:t>
             </a:fld>
             <a:endParaRPr lang="en-US"/>
           </a:p>
@@ -1951,7 +1957,7 @@
           <a:p>
             <a:fld id="{071CE23B-2943-3043-A28D-A3C0690BC927}" type="datetimeFigureOut">
               <a:rPr lang="en-US" smtClean="0"/>
-              <a:t>3/15/20</a:t>
+              <a:t>3/17/20</a:t>
             </a:fld>
             <a:endParaRPr lang="en-US"/>
           </a:p>
@@ -2064,7 +2070,7 @@
           <a:p>
             <a:fld id="{071CE23B-2943-3043-A28D-A3C0690BC927}" type="datetimeFigureOut">
               <a:rPr lang="en-US" smtClean="0"/>
-              <a:t>3/15/20</a:t>
+              <a:t>3/17/20</a:t>
             </a:fld>
             <a:endParaRPr lang="en-US"/>
           </a:p>
@@ -2375,7 +2381,7 @@
           <a:p>
             <a:fld id="{071CE23B-2943-3043-A28D-A3C0690BC927}" type="datetimeFigureOut">
               <a:rPr lang="en-US" smtClean="0"/>
-              <a:t>3/15/20</a:t>
+              <a:t>3/17/20</a:t>
             </a:fld>
             <a:endParaRPr lang="en-US"/>
           </a:p>
@@ -2663,7 +2669,7 @@
           <a:p>
             <a:fld id="{071CE23B-2943-3043-A28D-A3C0690BC927}" type="datetimeFigureOut">
               <a:rPr lang="en-US" smtClean="0"/>
-              <a:t>3/15/20</a:t>
+              <a:t>3/17/20</a:t>
             </a:fld>
             <a:endParaRPr lang="en-US"/>
           </a:p>
@@ -2904,7 +2910,7 @@
           <a:p>
             <a:fld id="{071CE23B-2943-3043-A28D-A3C0690BC927}" type="datetimeFigureOut">
               <a:rPr lang="en-US" smtClean="0"/>
-              <a:t>3/15/20</a:t>
+              <a:t>3/17/20</a:t>
             </a:fld>
             <a:endParaRPr lang="en-US"/>
           </a:p>
@@ -3713,35 +3719,6 @@
           </a:fontRef>
         </p:style>
       </p:cxnSp>
-      <p:pic>
-        <p:nvPicPr>
-          <p:cNvPr id="52" name="Picture 51" descr="A close up of a knife&#10;&#10;Description automatically generated">
-            <a:extLst>
-              <a:ext uri="{FF2B5EF4-FFF2-40B4-BE49-F238E27FC236}">
-                <a16:creationId xmlns:a16="http://schemas.microsoft.com/office/drawing/2014/main" id="{27552F99-3ECA-A04E-994D-8DF13D603515}"/>
-              </a:ext>
-            </a:extLst>
-          </p:cNvPr>
-          <p:cNvPicPr>
-            <a:picLocks noChangeAspect="1"/>
-          </p:cNvPicPr>
-          <p:nvPr/>
-        </p:nvPicPr>
-        <p:blipFill rotWithShape="1">
-          <a:blip r:embed="rId6"/>
-          <a:srcRect l="2743" t="35506" r="2743" b="33780"/>
-          <a:stretch/>
-        </p:blipFill>
-        <p:spPr>
-          <a:xfrm rot="10800000">
-            <a:off x="7918256" y="3005162"/>
-            <a:ext cx="1413182" cy="242956"/>
-          </a:xfrm>
-          <a:prstGeom prst="rect">
-            <a:avLst/>
-          </a:prstGeom>
-        </p:spPr>
-      </p:pic>
       <p:cxnSp>
         <p:nvCxnSpPr>
           <p:cNvPr id="58" name="Straight Arrow Connector 57">
@@ -3751,7 +3728,9 @@
               </a:ext>
             </a:extLst>
           </p:cNvPr>
-          <p:cNvCxnSpPr/>
+          <p:cNvCxnSpPr>
+            <a:cxnSpLocks/>
+          </p:cNvCxnSpPr>
           <p:nvPr/>
         </p:nvCxnSpPr>
         <p:spPr>
@@ -3793,13 +3772,16 @@
               </a:ext>
             </a:extLst>
           </p:cNvPr>
-          <p:cNvCxnSpPr/>
+          <p:cNvCxnSpPr>
+            <a:cxnSpLocks/>
+            <a:stCxn id="3" idx="3"/>
+          </p:cNvCxnSpPr>
           <p:nvPr/>
         </p:nvCxnSpPr>
         <p:spPr>
-          <a:xfrm>
-            <a:off x="9359808" y="3096582"/>
-            <a:ext cx="164892" cy="0"/>
+          <a:xfrm flipV="1">
+            <a:off x="8851349" y="3096583"/>
+            <a:ext cx="651579" cy="8174"/>
           </a:xfrm>
           <a:prstGeom prst="straightConnector1">
             <a:avLst/>
@@ -3840,7 +3822,7 @@
         </p:nvSpPr>
         <p:spPr>
           <a:xfrm>
-            <a:off x="8736910" y="4860091"/>
+            <a:off x="8747796" y="4860091"/>
             <a:ext cx="339777" cy="369332"/>
           </a:xfrm>
           <a:prstGeom prst="rect">
@@ -3924,7 +3906,7 @@
         </p:nvSpPr>
         <p:spPr>
           <a:xfrm>
-            <a:off x="9439648" y="2652356"/>
+            <a:off x="8980230" y="2728304"/>
             <a:ext cx="339777" cy="369332"/>
           </a:xfrm>
           <a:prstGeom prst="rect">
@@ -4050,7 +4032,7 @@
         </p:nvSpPr>
         <p:spPr>
           <a:xfrm>
-            <a:off x="780059" y="4004929"/>
+            <a:off x="780059" y="3721900"/>
             <a:ext cx="339777" cy="369332"/>
           </a:xfrm>
           <a:prstGeom prst="rect">
@@ -4092,7 +4074,7 @@
         </p:nvSpPr>
         <p:spPr>
           <a:xfrm>
-            <a:off x="1170899" y="3999154"/>
+            <a:off x="1170899" y="3716125"/>
             <a:ext cx="339777" cy="369332"/>
           </a:xfrm>
           <a:prstGeom prst="rect">
@@ -4134,7 +4116,7 @@
         </p:nvSpPr>
         <p:spPr>
           <a:xfrm>
-            <a:off x="1170899" y="4483050"/>
+            <a:off x="1170899" y="4385076"/>
             <a:ext cx="339777" cy="369332"/>
           </a:xfrm>
           <a:prstGeom prst="rect">
@@ -4176,7 +4158,7 @@
         </p:nvSpPr>
         <p:spPr>
           <a:xfrm>
-            <a:off x="1170899" y="4990544"/>
+            <a:off x="1170899" y="5054027"/>
             <a:ext cx="339777" cy="369332"/>
           </a:xfrm>
           <a:prstGeom prst="rect">
@@ -4218,7 +4200,7 @@
         </p:nvSpPr>
         <p:spPr>
           <a:xfrm>
-            <a:off x="1166819" y="5483438"/>
+            <a:off x="1170899" y="5722978"/>
             <a:ext cx="339777" cy="369332"/>
           </a:xfrm>
           <a:prstGeom prst="rect">
@@ -4260,8 +4242,8 @@
         </p:nvSpPr>
         <p:spPr>
           <a:xfrm>
-            <a:off x="1590351" y="4004518"/>
-            <a:ext cx="6864893" cy="369332"/>
+            <a:off x="1590351" y="3721489"/>
+            <a:ext cx="6911891" cy="646331"/>
           </a:xfrm>
           <a:prstGeom prst="rect">
             <a:avLst/>
@@ -4269,14 +4251,20 @@
           <a:noFill/>
         </p:spPr>
         <p:txBody>
-          <a:bodyPr wrap="none" rtlCol="0">
+          <a:bodyPr wrap="square" rtlCol="0">
             <a:spAutoFit/>
           </a:bodyPr>
           <a:lstStyle/>
           <a:p>
             <a:r>
               <a:rPr lang="en-US" dirty="0"/>
-              <a:t>Connect Display Port to the Mini Display Port Using the provided cables</a:t>
+              <a:t>Connect the output of the graphic cards Display Port to the Mini Display  </a:t>
+            </a:r>
+          </a:p>
+          <a:p>
+            <a:r>
+              <a:rPr lang="en-US" dirty="0"/>
+              <a:t>input port on the GC-Titan Ridge card using the provided cables</a:t>
             </a:r>
           </a:p>
         </p:txBody>
@@ -4295,8 +4283,8 @@
         </p:nvSpPr>
         <p:spPr>
           <a:xfrm>
-            <a:off x="1581419" y="4488853"/>
-            <a:ext cx="6760697" cy="369332"/>
+            <a:off x="1581419" y="4412651"/>
+            <a:ext cx="6760697" cy="646331"/>
           </a:xfrm>
           <a:prstGeom prst="rect">
             <a:avLst/>
@@ -4311,7 +4299,13 @@
           <a:p>
             <a:r>
               <a:rPr lang="en-US" dirty="0"/>
-              <a:t>Connect Thunderbolt 2 to 3 adapter to any of the thunderbolt 3 ports </a:t>
+              <a:t>Connect Thunderbolt 2 to 3 adapter to any of the Thunderbolt ports </a:t>
+            </a:r>
+          </a:p>
+          <a:p>
+            <a:r>
+              <a:rPr lang="en-US" dirty="0"/>
+              <a:t>on the GC-Titan Ridge card </a:t>
             </a:r>
           </a:p>
         </p:txBody>
@@ -4330,8 +4324,8 @@
         </p:nvSpPr>
         <p:spPr>
           <a:xfrm>
-            <a:off x="1590351" y="4993819"/>
-            <a:ext cx="5821594" cy="369332"/>
+            <a:off x="1590351" y="5080907"/>
+            <a:ext cx="6799297" cy="646331"/>
           </a:xfrm>
           <a:prstGeom prst="rect">
             <a:avLst/>
@@ -4346,7 +4340,13 @@
           <a:p>
             <a:r>
               <a:rPr lang="en-US" dirty="0"/>
-              <a:t>Connect the Thunderbolt cable from monitor to the adapter </a:t>
+              <a:t>Connect the Thunderbolt cable from Apple Thunderbolt Display to the </a:t>
+            </a:r>
+          </a:p>
+          <a:p>
+            <a:r>
+              <a:rPr lang="en-US" dirty="0"/>
+              <a:t>Thunderbolt adapter </a:t>
             </a:r>
           </a:p>
         </p:txBody>
@@ -4365,7 +4365,7 @@
         </p:nvSpPr>
         <p:spPr>
           <a:xfrm>
-            <a:off x="1594286" y="5498785"/>
+            <a:off x="1594286" y="5770935"/>
             <a:ext cx="6793723" cy="646331"/>
           </a:xfrm>
           <a:prstGeom prst="rect">
@@ -4381,7 +4381,7 @@
           <a:p>
             <a:r>
               <a:rPr lang="en-US" dirty="0"/>
-              <a:t>Connect second Thunderbolt cable from monitor to first thunderbolt display thunderbolt port at the back</a:t>
+              <a:t>Connect the cable from the second Thunderbolt Display to first Thunderbolt Display’s Thunderbolt port at the back</a:t>
             </a:r>
           </a:p>
         </p:txBody>
@@ -4468,10 +4468,904 @@
           </a:p>
         </p:txBody>
       </p:sp>
+      <p:pic>
+        <p:nvPicPr>
+          <p:cNvPr id="3" name="Picture 2" descr="A picture containing food&#10;&#10;Description automatically generated">
+            <a:extLst>
+              <a:ext uri="{FF2B5EF4-FFF2-40B4-BE49-F238E27FC236}">
+                <a16:creationId xmlns:a16="http://schemas.microsoft.com/office/drawing/2014/main" id="{15DA5466-4369-694E-A48F-08022D401654}"/>
+              </a:ext>
+            </a:extLst>
+          </p:cNvPr>
+          <p:cNvPicPr>
+            <a:picLocks noChangeAspect="1"/>
+          </p:cNvPicPr>
+          <p:nvPr/>
+        </p:nvPicPr>
+        <p:blipFill>
+          <a:blip r:embed="rId6"/>
+          <a:stretch>
+            <a:fillRect/>
+          </a:stretch>
+        </p:blipFill>
+        <p:spPr>
+          <a:xfrm>
+            <a:off x="7959764" y="3014340"/>
+            <a:ext cx="891585" cy="180833"/>
+          </a:xfrm>
+          <a:prstGeom prst="rect">
+            <a:avLst/>
+          </a:prstGeom>
+        </p:spPr>
+      </p:pic>
     </p:spTree>
     <p:extLst>
       <p:ext uri="{BB962C8B-B14F-4D97-AF65-F5344CB8AC3E}">
         <p14:creationId xmlns:p14="http://schemas.microsoft.com/office/powerpoint/2010/main" val="2006757515"/>
+      </p:ext>
+    </p:extLst>
+  </p:cSld>
+  <p:clrMapOvr>
+    <a:masterClrMapping/>
+  </p:clrMapOvr>
+</p:sld>
+</file>
+
+<file path=ppt/slides/slide2.xml><?xml version="1.0" encoding="utf-8"?>
+<p:sld xmlns:a="http://schemas.openxmlformats.org/drawingml/2006/main" xmlns:r="http://schemas.openxmlformats.org/officeDocument/2006/relationships" xmlns:p="http://schemas.openxmlformats.org/presentationml/2006/main">
+  <p:cSld>
+    <p:spTree>
+      <p:nvGrpSpPr>
+        <p:cNvPr id="1" name=""/>
+        <p:cNvGrpSpPr/>
+        <p:nvPr/>
+      </p:nvGrpSpPr>
+      <p:grpSpPr>
+        <a:xfrm>
+          <a:off x="0" y="0"/>
+          <a:ext cx="0" cy="0"/>
+          <a:chOff x="0" y="0"/>
+          <a:chExt cx="0" cy="0"/>
+        </a:xfrm>
+      </p:grpSpPr>
+      <p:pic>
+        <p:nvPicPr>
+          <p:cNvPr id="6" name="Picture 5" descr="A picture containing toy&#10;&#10;Description automatically generated">
+            <a:extLst>
+              <a:ext uri="{FF2B5EF4-FFF2-40B4-BE49-F238E27FC236}">
+                <a16:creationId xmlns:a16="http://schemas.microsoft.com/office/drawing/2014/main" id="{395400F1-F23E-0C45-AA18-0186BEE442BE}"/>
+              </a:ext>
+            </a:extLst>
+          </p:cNvPr>
+          <p:cNvPicPr>
+            <a:picLocks noChangeAspect="1"/>
+          </p:cNvPicPr>
+          <p:nvPr/>
+        </p:nvPicPr>
+        <p:blipFill>
+          <a:blip r:embed="rId2"/>
+          <a:stretch>
+            <a:fillRect/>
+          </a:stretch>
+        </p:blipFill>
+        <p:spPr>
+          <a:xfrm>
+            <a:off x="9090831" y="3847175"/>
+            <a:ext cx="2656070" cy="2656070"/>
+          </a:xfrm>
+          <a:prstGeom prst="rect">
+            <a:avLst/>
+          </a:prstGeom>
+        </p:spPr>
+      </p:pic>
+      <p:pic>
+        <p:nvPicPr>
+          <p:cNvPr id="20" name="Picture 19" descr="A circuit board&#10;&#10;Description automatically generated">
+            <a:extLst>
+              <a:ext uri="{FF2B5EF4-FFF2-40B4-BE49-F238E27FC236}">
+                <a16:creationId xmlns:a16="http://schemas.microsoft.com/office/drawing/2014/main" id="{71A0DA7D-B189-E041-8316-B58D833FDF57}"/>
+              </a:ext>
+            </a:extLst>
+          </p:cNvPr>
+          <p:cNvPicPr>
+            <a:picLocks noChangeAspect="1"/>
+          </p:cNvPicPr>
+          <p:nvPr/>
+        </p:nvPicPr>
+        <p:blipFill>
+          <a:blip r:embed="rId3"/>
+          <a:stretch>
+            <a:fillRect/>
+          </a:stretch>
+        </p:blipFill>
+        <p:spPr>
+          <a:xfrm>
+            <a:off x="9048578" y="2024958"/>
+            <a:ext cx="2340429" cy="2340429"/>
+          </a:xfrm>
+          <a:prstGeom prst="rect">
+            <a:avLst/>
+          </a:prstGeom>
+        </p:spPr>
+      </p:pic>
+      <p:sp>
+        <p:nvSpPr>
+          <p:cNvPr id="4" name="Rounded Rectangle 3">
+            <a:extLst>
+              <a:ext uri="{FF2B5EF4-FFF2-40B4-BE49-F238E27FC236}">
+                <a16:creationId xmlns:a16="http://schemas.microsoft.com/office/drawing/2014/main" id="{4A20DB4D-E650-ED47-92FE-655363CA953A}"/>
+              </a:ext>
+            </a:extLst>
+          </p:cNvPr>
+          <p:cNvSpPr/>
+          <p:nvPr/>
+        </p:nvSpPr>
+        <p:spPr>
+          <a:xfrm>
+            <a:off x="8949128" y="1388040"/>
+            <a:ext cx="2968052" cy="5297572"/>
+          </a:xfrm>
+          <a:prstGeom prst="roundRect">
+            <a:avLst/>
+          </a:prstGeom>
+          <a:noFill/>
+          <a:ln>
+            <a:solidFill>
+              <a:schemeClr val="bg1">
+                <a:lumMod val="75000"/>
+              </a:schemeClr>
+            </a:solidFill>
+          </a:ln>
+        </p:spPr>
+        <p:style>
+          <a:lnRef idx="2">
+            <a:schemeClr val="accent1">
+              <a:shade val="50000"/>
+            </a:schemeClr>
+          </a:lnRef>
+          <a:fillRef idx="1">
+            <a:schemeClr val="accent1"/>
+          </a:fillRef>
+          <a:effectRef idx="0">
+            <a:schemeClr val="accent1"/>
+          </a:effectRef>
+          <a:fontRef idx="minor">
+            <a:schemeClr val="lt1"/>
+          </a:fontRef>
+        </p:style>
+        <p:txBody>
+          <a:bodyPr rtlCol="0" anchor="ctr"/>
+          <a:lstStyle/>
+          <a:p>
+            <a:pPr algn="ctr"/>
+            <a:endParaRPr lang="en-US"/>
+          </a:p>
+        </p:txBody>
+      </p:sp>
+      <p:pic>
+        <p:nvPicPr>
+          <p:cNvPr id="7" name="Picture 6" descr="A close up of a speaker&#10;&#10;Description automatically generated">
+            <a:extLst>
+              <a:ext uri="{FF2B5EF4-FFF2-40B4-BE49-F238E27FC236}">
+                <a16:creationId xmlns:a16="http://schemas.microsoft.com/office/drawing/2014/main" id="{F7DF5AD1-7889-F849-BAFC-8CE2419CD696}"/>
+              </a:ext>
+            </a:extLst>
+          </p:cNvPr>
+          <p:cNvPicPr>
+            <a:picLocks noChangeAspect="1"/>
+          </p:cNvPicPr>
+          <p:nvPr/>
+        </p:nvPicPr>
+        <p:blipFill rotWithShape="1">
+          <a:blip r:embed="rId4"/>
+          <a:srcRect r="50000"/>
+          <a:stretch/>
+        </p:blipFill>
+        <p:spPr>
+          <a:xfrm>
+            <a:off x="8502242" y="553404"/>
+            <a:ext cx="997366" cy="1746208"/>
+          </a:xfrm>
+          <a:prstGeom prst="rect">
+            <a:avLst/>
+          </a:prstGeom>
+        </p:spPr>
+      </p:pic>
+      <p:cxnSp>
+        <p:nvCxnSpPr>
+          <p:cNvPr id="8" name="Elbow Connector 7">
+            <a:extLst>
+              <a:ext uri="{FF2B5EF4-FFF2-40B4-BE49-F238E27FC236}">
+                <a16:creationId xmlns:a16="http://schemas.microsoft.com/office/drawing/2014/main" id="{C2AEE35C-14E4-4142-8150-BC28D1A01863}"/>
+              </a:ext>
+            </a:extLst>
+          </p:cNvPr>
+          <p:cNvCxnSpPr>
+            <a:cxnSpLocks/>
+          </p:cNvCxnSpPr>
+          <p:nvPr/>
+        </p:nvCxnSpPr>
+        <p:spPr>
+          <a:xfrm rot="5400000" flipH="1" flipV="1">
+            <a:off x="8583316" y="3757512"/>
+            <a:ext cx="1636740" cy="1299573"/>
+          </a:xfrm>
+          <a:prstGeom prst="bentConnector3">
+            <a:avLst>
+              <a:gd name="adj1" fmla="val 100372"/>
+            </a:avLst>
+          </a:prstGeom>
+          <a:ln w="25400">
+            <a:solidFill>
+              <a:srgbClr val="C00000"/>
+            </a:solidFill>
+            <a:tailEnd type="triangle"/>
+          </a:ln>
+        </p:spPr>
+        <p:style>
+          <a:lnRef idx="1">
+            <a:schemeClr val="accent1"/>
+          </a:lnRef>
+          <a:fillRef idx="0">
+            <a:schemeClr val="accent1"/>
+          </a:fillRef>
+          <a:effectRef idx="0">
+            <a:schemeClr val="accent1"/>
+          </a:effectRef>
+          <a:fontRef idx="minor">
+            <a:schemeClr val="tx1"/>
+          </a:fontRef>
+        </p:style>
+      </p:cxnSp>
+      <p:cxnSp>
+        <p:nvCxnSpPr>
+          <p:cNvPr id="10" name="Straight Connector 9">
+            <a:extLst>
+              <a:ext uri="{FF2B5EF4-FFF2-40B4-BE49-F238E27FC236}">
+                <a16:creationId xmlns:a16="http://schemas.microsoft.com/office/drawing/2014/main" id="{638878D8-76BF-614A-A072-E2B5A22F9B3D}"/>
+              </a:ext>
+            </a:extLst>
+          </p:cNvPr>
+          <p:cNvCxnSpPr/>
+          <p:nvPr/>
+        </p:nvCxnSpPr>
+        <p:spPr>
+          <a:xfrm>
+            <a:off x="8736910" y="5227618"/>
+            <a:ext cx="781844" cy="0"/>
+          </a:xfrm>
+          <a:prstGeom prst="line">
+            <a:avLst/>
+          </a:prstGeom>
+          <a:ln w="25400">
+            <a:solidFill>
+              <a:srgbClr val="C00000"/>
+            </a:solidFill>
+          </a:ln>
+        </p:spPr>
+        <p:style>
+          <a:lnRef idx="1">
+            <a:schemeClr val="accent1"/>
+          </a:lnRef>
+          <a:fillRef idx="0">
+            <a:schemeClr val="accent1"/>
+          </a:fillRef>
+          <a:effectRef idx="0">
+            <a:schemeClr val="accent1"/>
+          </a:effectRef>
+          <a:fontRef idx="minor">
+            <a:schemeClr val="tx1"/>
+          </a:fontRef>
+        </p:style>
+      </p:cxnSp>
+      <p:cxnSp>
+        <p:nvCxnSpPr>
+          <p:cNvPr id="12" name="Straight Arrow Connector 11">
+            <a:extLst>
+              <a:ext uri="{FF2B5EF4-FFF2-40B4-BE49-F238E27FC236}">
+                <a16:creationId xmlns:a16="http://schemas.microsoft.com/office/drawing/2014/main" id="{D040C007-6EC6-5B41-A3A5-6C8926CEDF2F}"/>
+              </a:ext>
+            </a:extLst>
+          </p:cNvPr>
+          <p:cNvCxnSpPr>
+            <a:cxnSpLocks/>
+          </p:cNvCxnSpPr>
+          <p:nvPr/>
+        </p:nvCxnSpPr>
+        <p:spPr>
+          <a:xfrm>
+            <a:off x="8434359" y="3207507"/>
+            <a:ext cx="1063123" cy="0"/>
+          </a:xfrm>
+          <a:prstGeom prst="straightConnector1">
+            <a:avLst/>
+          </a:prstGeom>
+          <a:ln w="25400">
+            <a:solidFill>
+              <a:srgbClr val="C00000"/>
+            </a:solidFill>
+            <a:tailEnd type="triangle"/>
+          </a:ln>
+        </p:spPr>
+        <p:style>
+          <a:lnRef idx="1">
+            <a:schemeClr val="accent1"/>
+          </a:lnRef>
+          <a:fillRef idx="0">
+            <a:schemeClr val="accent1"/>
+          </a:fillRef>
+          <a:effectRef idx="0">
+            <a:schemeClr val="accent1"/>
+          </a:effectRef>
+          <a:fontRef idx="minor">
+            <a:schemeClr val="tx1"/>
+          </a:fontRef>
+        </p:style>
+      </p:cxnSp>
+      <p:sp>
+        <p:nvSpPr>
+          <p:cNvPr id="13" name="TextBox 12">
+            <a:extLst>
+              <a:ext uri="{FF2B5EF4-FFF2-40B4-BE49-F238E27FC236}">
+                <a16:creationId xmlns:a16="http://schemas.microsoft.com/office/drawing/2014/main" id="{1C137F46-3BCC-F348-9E3E-60EB7DF31624}"/>
+              </a:ext>
+            </a:extLst>
+          </p:cNvPr>
+          <p:cNvSpPr txBox="1"/>
+          <p:nvPr/>
+        </p:nvSpPr>
+        <p:spPr>
+          <a:xfrm>
+            <a:off x="8747796" y="4860091"/>
+            <a:ext cx="339777" cy="369332"/>
+          </a:xfrm>
+          <a:prstGeom prst="rect">
+            <a:avLst/>
+          </a:prstGeom>
+          <a:solidFill>
+            <a:srgbClr val="C00000"/>
+          </a:solidFill>
+        </p:spPr>
+        <p:txBody>
+          <a:bodyPr wrap="square" rtlCol="0">
+            <a:spAutoFit/>
+          </a:bodyPr>
+          <a:lstStyle/>
+          <a:p>
+            <a:pPr algn="ctr"/>
+            <a:r>
+              <a:rPr lang="en-US" dirty="0">
+                <a:solidFill>
+                  <a:schemeClr val="bg1"/>
+                </a:solidFill>
+              </a:rPr>
+              <a:t>1</a:t>
+            </a:r>
+          </a:p>
+        </p:txBody>
+      </p:sp>
+      <p:sp>
+        <p:nvSpPr>
+          <p:cNvPr id="15" name="TextBox 14">
+            <a:extLst>
+              <a:ext uri="{FF2B5EF4-FFF2-40B4-BE49-F238E27FC236}">
+                <a16:creationId xmlns:a16="http://schemas.microsoft.com/office/drawing/2014/main" id="{78E33869-0E6A-6049-97AA-0876DDF12E40}"/>
+              </a:ext>
+            </a:extLst>
+          </p:cNvPr>
+          <p:cNvSpPr txBox="1"/>
+          <p:nvPr/>
+        </p:nvSpPr>
+        <p:spPr>
+          <a:xfrm>
+            <a:off x="8547962" y="2825840"/>
+            <a:ext cx="339777" cy="369332"/>
+          </a:xfrm>
+          <a:prstGeom prst="rect">
+            <a:avLst/>
+          </a:prstGeom>
+          <a:solidFill>
+            <a:srgbClr val="C00000"/>
+          </a:solidFill>
+        </p:spPr>
+        <p:txBody>
+          <a:bodyPr wrap="square" rtlCol="0">
+            <a:spAutoFit/>
+          </a:bodyPr>
+          <a:lstStyle/>
+          <a:p>
+            <a:pPr algn="ctr"/>
+            <a:r>
+              <a:rPr lang="en-US" dirty="0">
+                <a:solidFill>
+                  <a:schemeClr val="bg1"/>
+                </a:solidFill>
+              </a:rPr>
+              <a:t>2</a:t>
+            </a:r>
+          </a:p>
+        </p:txBody>
+      </p:sp>
+      <p:sp>
+        <p:nvSpPr>
+          <p:cNvPr id="16" name="TextBox 15">
+            <a:extLst>
+              <a:ext uri="{FF2B5EF4-FFF2-40B4-BE49-F238E27FC236}">
+                <a16:creationId xmlns:a16="http://schemas.microsoft.com/office/drawing/2014/main" id="{6D7CC5CE-29A7-594F-8D70-CBF75B140B60}"/>
+              </a:ext>
+            </a:extLst>
+          </p:cNvPr>
+          <p:cNvSpPr txBox="1"/>
+          <p:nvPr/>
+        </p:nvSpPr>
+        <p:spPr>
+          <a:xfrm>
+            <a:off x="10848726" y="3522813"/>
+            <a:ext cx="1155122" cy="369332"/>
+          </a:xfrm>
+          <a:prstGeom prst="rect">
+            <a:avLst/>
+          </a:prstGeom>
+          <a:noFill/>
+        </p:spPr>
+        <p:txBody>
+          <a:bodyPr wrap="square" rtlCol="0">
+            <a:spAutoFit/>
+          </a:bodyPr>
+          <a:lstStyle/>
+          <a:p>
+            <a:r>
+              <a:rPr lang="en-US" dirty="0">
+                <a:solidFill>
+                  <a:schemeClr val="bg1">
+                    <a:lumMod val="65000"/>
+                  </a:schemeClr>
+                </a:solidFill>
+              </a:rPr>
+              <a:t>PCI Slot 3</a:t>
+            </a:r>
+          </a:p>
+        </p:txBody>
+      </p:sp>
+      <p:sp>
+        <p:nvSpPr>
+          <p:cNvPr id="17" name="TextBox 16">
+            <a:extLst>
+              <a:ext uri="{FF2B5EF4-FFF2-40B4-BE49-F238E27FC236}">
+                <a16:creationId xmlns:a16="http://schemas.microsoft.com/office/drawing/2014/main" id="{C4D3D135-85EF-6F4E-8A66-06846EBEF6C5}"/>
+              </a:ext>
+            </a:extLst>
+          </p:cNvPr>
+          <p:cNvSpPr txBox="1"/>
+          <p:nvPr/>
+        </p:nvSpPr>
+        <p:spPr>
+          <a:xfrm>
+            <a:off x="10848726" y="5668104"/>
+            <a:ext cx="1155122" cy="369332"/>
+          </a:xfrm>
+          <a:prstGeom prst="rect">
+            <a:avLst/>
+          </a:prstGeom>
+          <a:noFill/>
+        </p:spPr>
+        <p:txBody>
+          <a:bodyPr wrap="square" rtlCol="0">
+            <a:spAutoFit/>
+          </a:bodyPr>
+          <a:lstStyle/>
+          <a:p>
+            <a:r>
+              <a:rPr lang="en-US" dirty="0">
+                <a:solidFill>
+                  <a:schemeClr val="bg1">
+                    <a:lumMod val="65000"/>
+                  </a:schemeClr>
+                </a:solidFill>
+              </a:rPr>
+              <a:t>PCI Slot 1</a:t>
+            </a:r>
+          </a:p>
+        </p:txBody>
+      </p:sp>
+      <p:pic>
+        <p:nvPicPr>
+          <p:cNvPr id="18" name="Picture 17" descr="A picture containing food&#10;&#10;Description automatically generated">
+            <a:extLst>
+              <a:ext uri="{FF2B5EF4-FFF2-40B4-BE49-F238E27FC236}">
+                <a16:creationId xmlns:a16="http://schemas.microsoft.com/office/drawing/2014/main" id="{903EFB15-31F8-D64D-BB09-0D18CC813C65}"/>
+              </a:ext>
+            </a:extLst>
+          </p:cNvPr>
+          <p:cNvPicPr>
+            <a:picLocks noChangeAspect="1"/>
+          </p:cNvPicPr>
+          <p:nvPr/>
+        </p:nvPicPr>
+        <p:blipFill>
+          <a:blip r:embed="rId5"/>
+          <a:stretch>
+            <a:fillRect/>
+          </a:stretch>
+        </p:blipFill>
+        <p:spPr>
+          <a:xfrm>
+            <a:off x="7444159" y="3123293"/>
+            <a:ext cx="891585" cy="180833"/>
+          </a:xfrm>
+          <a:prstGeom prst="rect">
+            <a:avLst/>
+          </a:prstGeom>
+        </p:spPr>
+      </p:pic>
+      <p:pic>
+        <p:nvPicPr>
+          <p:cNvPr id="23" name="Picture 22" descr="A screen shot of a computer&#10;&#10;Description automatically generated">
+            <a:extLst>
+              <a:ext uri="{FF2B5EF4-FFF2-40B4-BE49-F238E27FC236}">
+                <a16:creationId xmlns:a16="http://schemas.microsoft.com/office/drawing/2014/main" id="{3690A452-82F4-9F45-9334-B0ED0AFCCE5A}"/>
+              </a:ext>
+            </a:extLst>
+          </p:cNvPr>
+          <p:cNvPicPr>
+            <a:picLocks noChangeAspect="1"/>
+          </p:cNvPicPr>
+          <p:nvPr/>
+        </p:nvPicPr>
+        <p:blipFill rotWithShape="1">
+          <a:blip r:embed="rId6"/>
+          <a:srcRect l="33633" r="24553"/>
+          <a:stretch/>
+        </p:blipFill>
+        <p:spPr>
+          <a:xfrm>
+            <a:off x="1317213" y="-103033"/>
+            <a:ext cx="5097958" cy="3950208"/>
+          </a:xfrm>
+          <a:prstGeom prst="rect">
+            <a:avLst/>
+          </a:prstGeom>
+        </p:spPr>
+      </p:pic>
+      <p:cxnSp>
+        <p:nvCxnSpPr>
+          <p:cNvPr id="24" name="Straight Arrow Connector 23">
+            <a:extLst>
+              <a:ext uri="{FF2B5EF4-FFF2-40B4-BE49-F238E27FC236}">
+                <a16:creationId xmlns:a16="http://schemas.microsoft.com/office/drawing/2014/main" id="{35DF960F-B60D-6147-B144-507FB0BCD021}"/>
+              </a:ext>
+            </a:extLst>
+          </p:cNvPr>
+          <p:cNvCxnSpPr>
+            <a:cxnSpLocks/>
+          </p:cNvCxnSpPr>
+          <p:nvPr/>
+        </p:nvCxnSpPr>
+        <p:spPr>
+          <a:xfrm>
+            <a:off x="6322694" y="3225597"/>
+            <a:ext cx="1063123" cy="0"/>
+          </a:xfrm>
+          <a:prstGeom prst="straightConnector1">
+            <a:avLst/>
+          </a:prstGeom>
+          <a:ln w="25400">
+            <a:solidFill>
+              <a:srgbClr val="C00000"/>
+            </a:solidFill>
+            <a:tailEnd type="triangle"/>
+          </a:ln>
+        </p:spPr>
+        <p:style>
+          <a:lnRef idx="1">
+            <a:schemeClr val="accent1"/>
+          </a:lnRef>
+          <a:fillRef idx="0">
+            <a:schemeClr val="accent1"/>
+          </a:fillRef>
+          <a:effectRef idx="0">
+            <a:schemeClr val="accent1"/>
+          </a:effectRef>
+          <a:fontRef idx="minor">
+            <a:schemeClr val="tx1"/>
+          </a:fontRef>
+        </p:style>
+      </p:cxnSp>
+      <p:sp>
+        <p:nvSpPr>
+          <p:cNvPr id="25" name="TextBox 24">
+            <a:extLst>
+              <a:ext uri="{FF2B5EF4-FFF2-40B4-BE49-F238E27FC236}">
+                <a16:creationId xmlns:a16="http://schemas.microsoft.com/office/drawing/2014/main" id="{269F3A2C-7156-634E-B8F3-A3188E7FDBBE}"/>
+              </a:ext>
+            </a:extLst>
+          </p:cNvPr>
+          <p:cNvSpPr txBox="1"/>
+          <p:nvPr/>
+        </p:nvSpPr>
+        <p:spPr>
+          <a:xfrm>
+            <a:off x="6628176" y="2856265"/>
+            <a:ext cx="339777" cy="369332"/>
+          </a:xfrm>
+          <a:prstGeom prst="rect">
+            <a:avLst/>
+          </a:prstGeom>
+          <a:solidFill>
+            <a:srgbClr val="C00000"/>
+          </a:solidFill>
+        </p:spPr>
+        <p:txBody>
+          <a:bodyPr wrap="square" rtlCol="0">
+            <a:spAutoFit/>
+          </a:bodyPr>
+          <a:lstStyle/>
+          <a:p>
+            <a:pPr algn="ctr"/>
+            <a:r>
+              <a:rPr lang="en-US" dirty="0">
+                <a:solidFill>
+                  <a:schemeClr val="bg1"/>
+                </a:solidFill>
+              </a:rPr>
+              <a:t>3</a:t>
+            </a:r>
+          </a:p>
+        </p:txBody>
+      </p:sp>
+      <p:sp>
+        <p:nvSpPr>
+          <p:cNvPr id="28" name="TextBox 27">
+            <a:extLst>
+              <a:ext uri="{FF2B5EF4-FFF2-40B4-BE49-F238E27FC236}">
+                <a16:creationId xmlns:a16="http://schemas.microsoft.com/office/drawing/2014/main" id="{B99F03C7-EF72-FE4E-BE7A-1803167F332B}"/>
+              </a:ext>
+            </a:extLst>
+          </p:cNvPr>
+          <p:cNvSpPr txBox="1"/>
+          <p:nvPr/>
+        </p:nvSpPr>
+        <p:spPr>
+          <a:xfrm>
+            <a:off x="1170899" y="3716125"/>
+            <a:ext cx="339777" cy="369332"/>
+          </a:xfrm>
+          <a:prstGeom prst="rect">
+            <a:avLst/>
+          </a:prstGeom>
+          <a:solidFill>
+            <a:srgbClr val="C00000"/>
+          </a:solidFill>
+        </p:spPr>
+        <p:txBody>
+          <a:bodyPr wrap="square" rtlCol="0">
+            <a:spAutoFit/>
+          </a:bodyPr>
+          <a:lstStyle/>
+          <a:p>
+            <a:pPr algn="ctr"/>
+            <a:r>
+              <a:rPr lang="en-US" dirty="0">
+                <a:solidFill>
+                  <a:schemeClr val="bg1"/>
+                </a:solidFill>
+              </a:rPr>
+              <a:t>1</a:t>
+            </a:r>
+          </a:p>
+        </p:txBody>
+      </p:sp>
+      <p:sp>
+        <p:nvSpPr>
+          <p:cNvPr id="29" name="TextBox 28">
+            <a:extLst>
+              <a:ext uri="{FF2B5EF4-FFF2-40B4-BE49-F238E27FC236}">
+                <a16:creationId xmlns:a16="http://schemas.microsoft.com/office/drawing/2014/main" id="{5FD4EC2F-C5C0-6B42-A2CE-E9BAC2373D05}"/>
+              </a:ext>
+            </a:extLst>
+          </p:cNvPr>
+          <p:cNvSpPr txBox="1"/>
+          <p:nvPr/>
+        </p:nvSpPr>
+        <p:spPr>
+          <a:xfrm>
+            <a:off x="1170899" y="4385076"/>
+            <a:ext cx="339777" cy="369332"/>
+          </a:xfrm>
+          <a:prstGeom prst="rect">
+            <a:avLst/>
+          </a:prstGeom>
+          <a:solidFill>
+            <a:srgbClr val="C00000"/>
+          </a:solidFill>
+        </p:spPr>
+        <p:txBody>
+          <a:bodyPr wrap="square" rtlCol="0">
+            <a:spAutoFit/>
+          </a:bodyPr>
+          <a:lstStyle/>
+          <a:p>
+            <a:pPr algn="ctr"/>
+            <a:r>
+              <a:rPr lang="en-US" dirty="0">
+                <a:solidFill>
+                  <a:schemeClr val="bg1"/>
+                </a:solidFill>
+              </a:rPr>
+              <a:t>2</a:t>
+            </a:r>
+          </a:p>
+        </p:txBody>
+      </p:sp>
+      <p:sp>
+        <p:nvSpPr>
+          <p:cNvPr id="30" name="TextBox 29">
+            <a:extLst>
+              <a:ext uri="{FF2B5EF4-FFF2-40B4-BE49-F238E27FC236}">
+                <a16:creationId xmlns:a16="http://schemas.microsoft.com/office/drawing/2014/main" id="{830996D5-3FEB-F247-AE16-34B23F5C0233}"/>
+              </a:ext>
+            </a:extLst>
+          </p:cNvPr>
+          <p:cNvSpPr txBox="1"/>
+          <p:nvPr/>
+        </p:nvSpPr>
+        <p:spPr>
+          <a:xfrm>
+            <a:off x="1170899" y="5054027"/>
+            <a:ext cx="339777" cy="369332"/>
+          </a:xfrm>
+          <a:prstGeom prst="rect">
+            <a:avLst/>
+          </a:prstGeom>
+          <a:solidFill>
+            <a:srgbClr val="C00000"/>
+          </a:solidFill>
+        </p:spPr>
+        <p:txBody>
+          <a:bodyPr wrap="square" rtlCol="0">
+            <a:spAutoFit/>
+          </a:bodyPr>
+          <a:lstStyle/>
+          <a:p>
+            <a:pPr algn="ctr"/>
+            <a:r>
+              <a:rPr lang="en-US" dirty="0">
+                <a:solidFill>
+                  <a:schemeClr val="bg1"/>
+                </a:solidFill>
+              </a:rPr>
+              <a:t>3</a:t>
+            </a:r>
+          </a:p>
+        </p:txBody>
+      </p:sp>
+      <p:sp>
+        <p:nvSpPr>
+          <p:cNvPr id="32" name="TextBox 31">
+            <a:extLst>
+              <a:ext uri="{FF2B5EF4-FFF2-40B4-BE49-F238E27FC236}">
+                <a16:creationId xmlns:a16="http://schemas.microsoft.com/office/drawing/2014/main" id="{BA52F1E0-2E8C-BB42-968A-799EAC05B9F7}"/>
+              </a:ext>
+            </a:extLst>
+          </p:cNvPr>
+          <p:cNvSpPr txBox="1"/>
+          <p:nvPr/>
+        </p:nvSpPr>
+        <p:spPr>
+          <a:xfrm>
+            <a:off x="1590351" y="3721489"/>
+            <a:ext cx="6911891" cy="646331"/>
+          </a:xfrm>
+          <a:prstGeom prst="rect">
+            <a:avLst/>
+          </a:prstGeom>
+          <a:noFill/>
+        </p:spPr>
+        <p:txBody>
+          <a:bodyPr wrap="square" rtlCol="0">
+            <a:spAutoFit/>
+          </a:bodyPr>
+          <a:lstStyle/>
+          <a:p>
+            <a:r>
+              <a:rPr lang="en-US" dirty="0"/>
+              <a:t>Connect the output of the graphic cards Display Port to the Mini Display  </a:t>
+            </a:r>
+          </a:p>
+          <a:p>
+            <a:r>
+              <a:rPr lang="en-US" dirty="0"/>
+              <a:t>input port on the GC-Titan Ridge card using the provided cables</a:t>
+            </a:r>
+          </a:p>
+        </p:txBody>
+      </p:sp>
+      <p:sp>
+        <p:nvSpPr>
+          <p:cNvPr id="33" name="TextBox 32">
+            <a:extLst>
+              <a:ext uri="{FF2B5EF4-FFF2-40B4-BE49-F238E27FC236}">
+                <a16:creationId xmlns:a16="http://schemas.microsoft.com/office/drawing/2014/main" id="{20980AB6-0A19-0949-850B-D80AAC8C2A93}"/>
+              </a:ext>
+            </a:extLst>
+          </p:cNvPr>
+          <p:cNvSpPr txBox="1"/>
+          <p:nvPr/>
+        </p:nvSpPr>
+        <p:spPr>
+          <a:xfrm>
+            <a:off x="1581419" y="4412651"/>
+            <a:ext cx="6760697" cy="646331"/>
+          </a:xfrm>
+          <a:prstGeom prst="rect">
+            <a:avLst/>
+          </a:prstGeom>
+          <a:noFill/>
+        </p:spPr>
+        <p:txBody>
+          <a:bodyPr wrap="none" rtlCol="0">
+            <a:spAutoFit/>
+          </a:bodyPr>
+          <a:lstStyle/>
+          <a:p>
+            <a:r>
+              <a:rPr lang="en-US" dirty="0"/>
+              <a:t>Connect Thunderbolt 2 to 3 adapter to any of the Thunderbolt ports </a:t>
+            </a:r>
+          </a:p>
+          <a:p>
+            <a:r>
+              <a:rPr lang="en-US" dirty="0"/>
+              <a:t>on the GC-Titan Ridge card </a:t>
+            </a:r>
+          </a:p>
+        </p:txBody>
+      </p:sp>
+      <p:sp>
+        <p:nvSpPr>
+          <p:cNvPr id="34" name="TextBox 33">
+            <a:extLst>
+              <a:ext uri="{FF2B5EF4-FFF2-40B4-BE49-F238E27FC236}">
+                <a16:creationId xmlns:a16="http://schemas.microsoft.com/office/drawing/2014/main" id="{0817B39D-985F-704A-AB70-5C6D5B817D58}"/>
+              </a:ext>
+            </a:extLst>
+          </p:cNvPr>
+          <p:cNvSpPr txBox="1"/>
+          <p:nvPr/>
+        </p:nvSpPr>
+        <p:spPr>
+          <a:xfrm>
+            <a:off x="1590351" y="5080907"/>
+            <a:ext cx="6799297" cy="646331"/>
+          </a:xfrm>
+          <a:prstGeom prst="rect">
+            <a:avLst/>
+          </a:prstGeom>
+          <a:noFill/>
+        </p:spPr>
+        <p:txBody>
+          <a:bodyPr wrap="none" rtlCol="0">
+            <a:spAutoFit/>
+          </a:bodyPr>
+          <a:lstStyle/>
+          <a:p>
+            <a:r>
+              <a:rPr lang="en-US" dirty="0"/>
+              <a:t>Connect the Thunderbolt cable from Apple Thunderbolt Display to the </a:t>
+            </a:r>
+          </a:p>
+          <a:p>
+            <a:r>
+              <a:rPr lang="en-US" dirty="0"/>
+              <a:t>Thunderbolt adapter </a:t>
+            </a:r>
+          </a:p>
+        </p:txBody>
+      </p:sp>
+    </p:spTree>
+    <p:extLst>
+      <p:ext uri="{BB962C8B-B14F-4D97-AF65-F5344CB8AC3E}">
+        <p14:creationId xmlns:p14="http://schemas.microsoft.com/office/powerpoint/2010/main" val="2558004732"/>
       </p:ext>
     </p:extLst>
   </p:cSld>

</xml_diff>